<commit_message>
changes to architecture diagram
</commit_message>
<xml_diff>
--- a/Architecture Documents.pptx
+++ b/Architecture Documents.pptx
@@ -11,8 +11,12 @@
     <p:sldId id="259" r:id="rId8"/>
     <p:sldId id="260" r:id="rId9"/>
     <p:sldId id="261" r:id="rId10"/>
-    <p:sldId id="263" r:id="rId11"/>
-    <p:sldId id="262" r:id="rId12"/>
+    <p:sldId id="267" r:id="rId11"/>
+    <p:sldId id="263" r:id="rId12"/>
+    <p:sldId id="264" r:id="rId13"/>
+    <p:sldId id="265" r:id="rId14"/>
+    <p:sldId id="266" r:id="rId15"/>
+    <p:sldId id="262" r:id="rId16"/>
   </p:sldIdLst>
   <p:sldSz cx="12192000" cy="6858000"/>
   <p:notesSz cx="6858000" cy="9144000"/>
@@ -3408,6 +3412,217 @@
 </p:sld>
 </file>
 
+<file path=ppt/slides/slide10.xml><?xml version="1.0" encoding="utf-8"?>
+<p:sld xmlns:a="http://schemas.openxmlformats.org/drawingml/2006/main" xmlns:r="http://schemas.openxmlformats.org/officeDocument/2006/relationships" xmlns:p="http://schemas.openxmlformats.org/presentationml/2006/main">
+  <p:cSld>
+    <p:spTree>
+      <p:nvGrpSpPr>
+        <p:cNvPr id="1" name="">
+          <a:extLst>
+            <a:ext uri="{FF2B5EF4-FFF2-40B4-BE49-F238E27FC236}">
+              <a16:creationId xmlns:a16="http://schemas.microsoft.com/office/drawing/2014/main" id="{358DAA71-0A25-7411-664B-919E4D805798}"/>
+            </a:ext>
+          </a:extLst>
+        </p:cNvPr>
+        <p:cNvGrpSpPr/>
+        <p:nvPr/>
+      </p:nvGrpSpPr>
+      <p:grpSpPr>
+        <a:xfrm>
+          <a:off x="0" y="0"/>
+          <a:ext cx="0" cy="0"/>
+          <a:chOff x="0" y="0"/>
+          <a:chExt cx="0" cy="0"/>
+        </a:xfrm>
+      </p:grpSpPr>
+      <p:sp>
+        <p:nvSpPr>
+          <p:cNvPr id="4" name="Title 1">
+            <a:extLst>
+              <a:ext uri="{FF2B5EF4-FFF2-40B4-BE49-F238E27FC236}">
+                <a16:creationId xmlns:a16="http://schemas.microsoft.com/office/drawing/2014/main" id="{5E11853B-25EB-F0A8-BF58-DABACA545F97}"/>
+              </a:ext>
+            </a:extLst>
+          </p:cNvPr>
+          <p:cNvSpPr>
+            <a:spLocks noGrp="1"/>
+          </p:cNvSpPr>
+          <p:nvPr>
+            <p:ph type="title"/>
+          </p:nvPr>
+        </p:nvSpPr>
+        <p:spPr>
+          <a:xfrm>
+            <a:off x="0" y="0"/>
+            <a:ext cx="10515600" cy="1060173"/>
+          </a:xfrm>
+        </p:spPr>
+        <p:txBody>
+          <a:bodyPr/>
+          <a:lstStyle/>
+          <a:p>
+            <a:r>
+              <a:rPr lang="en-GB" dirty="0"/>
+              <a:t>Database Design Diagram – </a:t>
+            </a:r>
+            <a:r>
+              <a:rPr lang="en-GB" dirty="0" err="1"/>
+              <a:t>TripleMatching</a:t>
+            </a:r>
+            <a:endParaRPr lang="en-GB" dirty="0"/>
+          </a:p>
+        </p:txBody>
+      </p:sp>
+    </p:spTree>
+    <p:extLst>
+      <p:ext uri="{BB962C8B-B14F-4D97-AF65-F5344CB8AC3E}">
+        <p14:creationId xmlns:p14="http://schemas.microsoft.com/office/powerpoint/2010/main" val="1245746550"/>
+      </p:ext>
+    </p:extLst>
+  </p:cSld>
+  <p:clrMapOvr>
+    <a:masterClrMapping/>
+  </p:clrMapOvr>
+</p:sld>
+</file>
+
+<file path=ppt/slides/slide11.xml><?xml version="1.0" encoding="utf-8"?>
+<p:sld xmlns:a="http://schemas.openxmlformats.org/drawingml/2006/main" xmlns:r="http://schemas.openxmlformats.org/officeDocument/2006/relationships" xmlns:p="http://schemas.openxmlformats.org/presentationml/2006/main">
+  <p:cSld>
+    <p:spTree>
+      <p:nvGrpSpPr>
+        <p:cNvPr id="1" name="">
+          <a:extLst>
+            <a:ext uri="{FF2B5EF4-FFF2-40B4-BE49-F238E27FC236}">
+              <a16:creationId xmlns:a16="http://schemas.microsoft.com/office/drawing/2014/main" id="{DC5C4E1E-051E-1F5A-212B-C7365D115875}"/>
+            </a:ext>
+          </a:extLst>
+        </p:cNvPr>
+        <p:cNvGrpSpPr/>
+        <p:nvPr/>
+      </p:nvGrpSpPr>
+      <p:grpSpPr>
+        <a:xfrm>
+          <a:off x="0" y="0"/>
+          <a:ext cx="0" cy="0"/>
+          <a:chOff x="0" y="0"/>
+          <a:chExt cx="0" cy="0"/>
+        </a:xfrm>
+      </p:grpSpPr>
+      <p:sp>
+        <p:nvSpPr>
+          <p:cNvPr id="4" name="Title 1">
+            <a:extLst>
+              <a:ext uri="{FF2B5EF4-FFF2-40B4-BE49-F238E27FC236}">
+                <a16:creationId xmlns:a16="http://schemas.microsoft.com/office/drawing/2014/main" id="{512573B7-8231-88BE-06FA-A922C11267AD}"/>
+              </a:ext>
+            </a:extLst>
+          </p:cNvPr>
+          <p:cNvSpPr>
+            <a:spLocks noGrp="1"/>
+          </p:cNvSpPr>
+          <p:nvPr>
+            <p:ph type="title"/>
+          </p:nvPr>
+        </p:nvSpPr>
+        <p:spPr>
+          <a:xfrm>
+            <a:off x="0" y="0"/>
+            <a:ext cx="10515600" cy="1060173"/>
+          </a:xfrm>
+        </p:spPr>
+        <p:txBody>
+          <a:bodyPr/>
+          <a:lstStyle/>
+          <a:p>
+            <a:r>
+              <a:rPr lang="en-GB" dirty="0"/>
+              <a:t>Database Design Diagram – </a:t>
+            </a:r>
+            <a:r>
+              <a:rPr lang="en-GB" dirty="0" err="1"/>
+              <a:t>PaymentRuns</a:t>
+            </a:r>
+            <a:endParaRPr lang="en-GB" dirty="0"/>
+          </a:p>
+        </p:txBody>
+      </p:sp>
+    </p:spTree>
+    <p:extLst>
+      <p:ext uri="{BB962C8B-B14F-4D97-AF65-F5344CB8AC3E}">
+        <p14:creationId xmlns:p14="http://schemas.microsoft.com/office/powerpoint/2010/main" val="1944168197"/>
+      </p:ext>
+    </p:extLst>
+  </p:cSld>
+  <p:clrMapOvr>
+    <a:masterClrMapping/>
+  </p:clrMapOvr>
+</p:sld>
+</file>
+
+<file path=ppt/slides/slide12.xml><?xml version="1.0" encoding="utf-8"?>
+<p:sld xmlns:a="http://schemas.openxmlformats.org/drawingml/2006/main" xmlns:r="http://schemas.openxmlformats.org/officeDocument/2006/relationships" xmlns:p="http://schemas.openxmlformats.org/presentationml/2006/main">
+  <p:cSld>
+    <p:spTree>
+      <p:nvGrpSpPr>
+        <p:cNvPr id="1" name=""/>
+        <p:cNvGrpSpPr/>
+        <p:nvPr/>
+      </p:nvGrpSpPr>
+      <p:grpSpPr>
+        <a:xfrm>
+          <a:off x="0" y="0"/>
+          <a:ext cx="0" cy="0"/>
+          <a:chOff x="0" y="0"/>
+          <a:chExt cx="0" cy="0"/>
+        </a:xfrm>
+      </p:grpSpPr>
+      <p:sp>
+        <p:nvSpPr>
+          <p:cNvPr id="2" name="Title 1">
+            <a:extLst>
+              <a:ext uri="{FF2B5EF4-FFF2-40B4-BE49-F238E27FC236}">
+                <a16:creationId xmlns:a16="http://schemas.microsoft.com/office/drawing/2014/main" id="{C8A7020B-B65F-7D7F-56EA-F423E7D3738C}"/>
+              </a:ext>
+            </a:extLst>
+          </p:cNvPr>
+          <p:cNvSpPr>
+            <a:spLocks noGrp="1"/>
+          </p:cNvSpPr>
+          <p:nvPr>
+            <p:ph type="title"/>
+          </p:nvPr>
+        </p:nvSpPr>
+        <p:spPr>
+          <a:xfrm>
+            <a:off x="717884" y="353094"/>
+            <a:ext cx="10515600" cy="1325563"/>
+          </a:xfrm>
+        </p:spPr>
+        <p:txBody>
+          <a:bodyPr/>
+          <a:lstStyle/>
+          <a:p>
+            <a:r>
+              <a:rPr lang="en-GB" dirty="0"/>
+              <a:t>API Sequence Diagrams</a:t>
+            </a:r>
+          </a:p>
+        </p:txBody>
+      </p:sp>
+    </p:spTree>
+    <p:extLst>
+      <p:ext uri="{BB962C8B-B14F-4D97-AF65-F5344CB8AC3E}">
+        <p14:creationId xmlns:p14="http://schemas.microsoft.com/office/powerpoint/2010/main" val="335257435"/>
+      </p:ext>
+    </p:extLst>
+  </p:cSld>
+  <p:clrMapOvr>
+    <a:masterClrMapping/>
+  </p:clrMapOvr>
+</p:sld>
+</file>
+
 <file path=ppt/slides/slide2.xml><?xml version="1.0" encoding="utf-8"?>
 <p:sld xmlns:a="http://schemas.openxmlformats.org/drawingml/2006/main" xmlns:r="http://schemas.openxmlformats.org/officeDocument/2006/relationships" xmlns:p="http://schemas.openxmlformats.org/presentationml/2006/main">
   <p:cSld>
@@ -3445,8 +3660,8 @@
         </p:nvSpPr>
         <p:spPr>
           <a:xfrm>
-            <a:off x="3892550" y="533400"/>
-            <a:ext cx="4406900" cy="369332"/>
+            <a:off x="0" y="0"/>
+            <a:ext cx="11150600" cy="769441"/>
           </a:xfrm>
           <a:prstGeom prst="rect">
             <a:avLst/>
@@ -3460,7 +3675,7 @@
           <a:lstStyle/>
           <a:p>
             <a:r>
-              <a:rPr lang="en-GB" u="sng" dirty="0"/>
+              <a:rPr lang="en-GB" sz="4400" u="sng" dirty="0"/>
               <a:t>Accounts Payable Business Process 1.0  </a:t>
             </a:r>
           </a:p>
@@ -3546,8 +3761,8 @@
         </p:nvSpPr>
         <p:spPr>
           <a:xfrm>
-            <a:off x="3892550" y="533400"/>
-            <a:ext cx="4086327" cy="369332"/>
+            <a:off x="0" y="0"/>
+            <a:ext cx="10165488" cy="769441"/>
           </a:xfrm>
           <a:prstGeom prst="rect">
             <a:avLst/>
@@ -3561,7 +3776,7 @@
           <a:lstStyle/>
           <a:p>
             <a:r>
-              <a:rPr lang="en-GB" u="sng" dirty="0"/>
+              <a:rPr lang="en-GB" sz="4400" u="sng" dirty="0"/>
               <a:t>Accounts Payable Business Process 1.1  </a:t>
             </a:r>
           </a:p>
@@ -3595,7 +3810,7 @@
         </p:blipFill>
         <p:spPr>
           <a:xfrm>
-            <a:off x="626805" y="1096699"/>
+            <a:off x="220405" y="1096699"/>
             <a:ext cx="10551939" cy="4330709"/>
           </a:xfrm>
           <a:prstGeom prst="rect">
@@ -3752,7 +3967,7 @@
         </p:nvSpPr>
         <p:spPr>
           <a:xfrm>
-            <a:off x="753979" y="191111"/>
+            <a:off x="0" y="25917"/>
             <a:ext cx="10515600" cy="1060173"/>
           </a:xfrm>
         </p:spPr>
@@ -3815,13 +4030,13 @@
         </p:nvSpPr>
         <p:spPr>
           <a:xfrm>
-            <a:off x="645695" y="323458"/>
-            <a:ext cx="10515600" cy="1060173"/>
+            <a:off x="0" y="0"/>
+            <a:ext cx="11112500" cy="1060173"/>
           </a:xfrm>
         </p:spPr>
         <p:txBody>
           <a:bodyPr>
-            <a:normAutofit fontScale="90000"/>
+            <a:noAutofit/>
           </a:bodyPr>
           <a:lstStyle/>
           <a:p>
@@ -3860,8 +4075,8 @@
         </p:blipFill>
         <p:spPr>
           <a:xfrm>
-            <a:off x="1582616" y="1569294"/>
-            <a:ext cx="8171350" cy="4457100"/>
+            <a:off x="1428416" y="1383631"/>
+            <a:ext cx="8737886" cy="4766120"/>
           </a:xfrm>
           <a:prstGeom prst="rect">
             <a:avLst/>
@@ -3889,6 +4104,113 @@
         <p:cNvPr id="1" name="">
           <a:extLst>
             <a:ext uri="{FF2B5EF4-FFF2-40B4-BE49-F238E27FC236}">
+              <a16:creationId xmlns:a16="http://schemas.microsoft.com/office/drawing/2014/main" id="{4FE11665-4609-A986-6103-44C9DDF72132}"/>
+            </a:ext>
+          </a:extLst>
+        </p:cNvPr>
+        <p:cNvGrpSpPr/>
+        <p:nvPr/>
+      </p:nvGrpSpPr>
+      <p:grpSpPr>
+        <a:xfrm>
+          <a:off x="0" y="0"/>
+          <a:ext cx="0" cy="0"/>
+          <a:chOff x="0" y="0"/>
+          <a:chExt cx="0" cy="0"/>
+        </a:xfrm>
+      </p:grpSpPr>
+      <p:sp>
+        <p:nvSpPr>
+          <p:cNvPr id="4" name="Title 1">
+            <a:extLst>
+              <a:ext uri="{FF2B5EF4-FFF2-40B4-BE49-F238E27FC236}">
+                <a16:creationId xmlns:a16="http://schemas.microsoft.com/office/drawing/2014/main" id="{A615D2A9-B2DD-56FD-1949-9052DE0A7DE7}"/>
+              </a:ext>
+            </a:extLst>
+          </p:cNvPr>
+          <p:cNvSpPr>
+            <a:spLocks noGrp="1"/>
+          </p:cNvSpPr>
+          <p:nvPr>
+            <p:ph type="title"/>
+          </p:nvPr>
+        </p:nvSpPr>
+        <p:spPr>
+          <a:xfrm>
+            <a:off x="0" y="0"/>
+            <a:ext cx="11061700" cy="1060173"/>
+          </a:xfrm>
+        </p:spPr>
+        <p:txBody>
+          <a:bodyPr>
+            <a:noAutofit/>
+          </a:bodyPr>
+          <a:lstStyle/>
+          <a:p>
+            <a:r>
+              <a:rPr lang="en-GB" dirty="0"/>
+              <a:t>Database Design Diagram – Authentication 1.1</a:t>
+            </a:r>
+          </a:p>
+        </p:txBody>
+      </p:sp>
+      <p:pic>
+        <p:nvPicPr>
+          <p:cNvPr id="7" name="Picture 6" descr="A diagram of a computer&#10;&#10;AI-generated content may be incorrect.">
+            <a:extLst>
+              <a:ext uri="{FF2B5EF4-FFF2-40B4-BE49-F238E27FC236}">
+                <a16:creationId xmlns:a16="http://schemas.microsoft.com/office/drawing/2014/main" id="{CE6FFE55-91DD-85FE-8F79-065EAEF5BEB4}"/>
+              </a:ext>
+            </a:extLst>
+          </p:cNvPr>
+          <p:cNvPicPr>
+            <a:picLocks noChangeAspect="1"/>
+          </p:cNvPicPr>
+          <p:nvPr/>
+        </p:nvPicPr>
+        <p:blipFill>
+          <a:blip r:embed="rId2">
+            <a:extLst>
+              <a:ext uri="{28A0092B-C50C-407E-A947-70E740481C1C}">
+                <a14:useLocalDpi xmlns:a14="http://schemas.microsoft.com/office/drawing/2010/main" val="0"/>
+              </a:ext>
+            </a:extLst>
+          </a:blip>
+          <a:stretch>
+            <a:fillRect/>
+          </a:stretch>
+        </p:blipFill>
+        <p:spPr>
+          <a:xfrm>
+            <a:off x="1243512" y="1503515"/>
+            <a:ext cx="8397791" cy="4539346"/>
+          </a:xfrm>
+          <a:prstGeom prst="rect">
+            <a:avLst/>
+          </a:prstGeom>
+        </p:spPr>
+      </p:pic>
+    </p:spTree>
+    <p:extLst>
+      <p:ext uri="{BB962C8B-B14F-4D97-AF65-F5344CB8AC3E}">
+        <p14:creationId xmlns:p14="http://schemas.microsoft.com/office/powerpoint/2010/main" val="714692361"/>
+      </p:ext>
+    </p:extLst>
+  </p:cSld>
+  <p:clrMapOvr>
+    <a:masterClrMapping/>
+  </p:clrMapOvr>
+</p:sld>
+</file>
+
+<file path=ppt/slides/slide8.xml><?xml version="1.0" encoding="utf-8"?>
+<p:sld xmlns:a="http://schemas.openxmlformats.org/drawingml/2006/main" xmlns:r="http://schemas.openxmlformats.org/officeDocument/2006/relationships" xmlns:p="http://schemas.openxmlformats.org/presentationml/2006/main">
+  <p:cSld>
+    <p:spTree>
+      <p:nvGrpSpPr>
+        <p:cNvPr id="1" name="">
+          <a:extLst>
+            <a:ext uri="{FF2B5EF4-FFF2-40B4-BE49-F238E27FC236}">
               <a16:creationId xmlns:a16="http://schemas.microsoft.com/office/drawing/2014/main" id="{ADCADEBA-F356-DF2D-09D1-4F4C9FC0A65A}"/>
             </a:ext>
           </a:extLst>
@@ -3922,21 +4244,59 @@
         </p:nvSpPr>
         <p:spPr>
           <a:xfrm>
-            <a:off x="705853" y="431742"/>
-            <a:ext cx="10515600" cy="1060173"/>
+            <a:off x="0" y="0"/>
+            <a:ext cx="10998200" cy="1060173"/>
           </a:xfrm>
         </p:spPr>
         <p:txBody>
-          <a:bodyPr/>
+          <a:bodyPr>
+            <a:noAutofit/>
+          </a:bodyPr>
           <a:lstStyle/>
           <a:p>
             <a:r>
               <a:rPr lang="en-GB" dirty="0"/>
-              <a:t>Database Design Diagram - Authentication</a:t>
-            </a:r>
-          </a:p>
-        </p:txBody>
-      </p:sp>
+              <a:t>Database Design Diagram – Purchase Order 1.0</a:t>
+            </a:r>
+          </a:p>
+        </p:txBody>
+      </p:sp>
+      <p:pic>
+        <p:nvPicPr>
+          <p:cNvPr id="6" name="Picture 5" descr="A screenshot of a computer&#10;&#10;AI-generated content may be incorrect.">
+            <a:extLst>
+              <a:ext uri="{FF2B5EF4-FFF2-40B4-BE49-F238E27FC236}">
+                <a16:creationId xmlns:a16="http://schemas.microsoft.com/office/drawing/2014/main" id="{184A8512-2099-BD3A-E267-7012317EEA2A}"/>
+              </a:ext>
+            </a:extLst>
+          </p:cNvPr>
+          <p:cNvPicPr>
+            <a:picLocks noChangeAspect="1"/>
+          </p:cNvPicPr>
+          <p:nvPr/>
+        </p:nvPicPr>
+        <p:blipFill>
+          <a:blip r:embed="rId2">
+            <a:extLst>
+              <a:ext uri="{28A0092B-C50C-407E-A947-70E740481C1C}">
+                <a14:useLocalDpi xmlns:a14="http://schemas.microsoft.com/office/drawing/2010/main" val="0"/>
+              </a:ext>
+            </a:extLst>
+          </a:blip>
+          <a:stretch>
+            <a:fillRect/>
+          </a:stretch>
+        </p:blipFill>
+        <p:spPr>
+          <a:xfrm>
+            <a:off x="1958390" y="1874921"/>
+            <a:ext cx="8010525" cy="3429000"/>
+          </a:xfrm>
+          <a:prstGeom prst="rect">
+            <a:avLst/>
+          </a:prstGeom>
+        </p:spPr>
+      </p:pic>
     </p:spTree>
     <p:extLst>
       <p:ext uri="{BB962C8B-B14F-4D97-AF65-F5344CB8AC3E}">
@@ -3950,12 +4310,18 @@
 </p:sld>
 </file>
 
-<file path=ppt/slides/slide8.xml><?xml version="1.0" encoding="utf-8"?>
+<file path=ppt/slides/slide9.xml><?xml version="1.0" encoding="utf-8"?>
 <p:sld xmlns:a="http://schemas.openxmlformats.org/drawingml/2006/main" xmlns:r="http://schemas.openxmlformats.org/officeDocument/2006/relationships" xmlns:p="http://schemas.openxmlformats.org/presentationml/2006/main">
   <p:cSld>
     <p:spTree>
       <p:nvGrpSpPr>
-        <p:cNvPr id="1" name=""/>
+        <p:cNvPr id="1" name="">
+          <a:extLst>
+            <a:ext uri="{FF2B5EF4-FFF2-40B4-BE49-F238E27FC236}">
+              <a16:creationId xmlns:a16="http://schemas.microsoft.com/office/drawing/2014/main" id="{298EB385-A7DC-9CD0-CB8A-895EDF81AC3D}"/>
+            </a:ext>
+          </a:extLst>
+        </p:cNvPr>
         <p:cNvGrpSpPr/>
         <p:nvPr/>
       </p:nvGrpSpPr>
@@ -3969,10 +4335,10 @@
       </p:grpSpPr>
       <p:sp>
         <p:nvSpPr>
-          <p:cNvPr id="2" name="Title 1">
-            <a:extLst>
-              <a:ext uri="{FF2B5EF4-FFF2-40B4-BE49-F238E27FC236}">
-                <a16:creationId xmlns:a16="http://schemas.microsoft.com/office/drawing/2014/main" id="{C8A7020B-B65F-7D7F-56EA-F423E7D3738C}"/>
+          <p:cNvPr id="4" name="Title 1">
+            <a:extLst>
+              <a:ext uri="{FF2B5EF4-FFF2-40B4-BE49-F238E27FC236}">
+                <a16:creationId xmlns:a16="http://schemas.microsoft.com/office/drawing/2014/main" id="{1DBF0CAB-CDF1-BCAA-0AAF-DB70FB974256}"/>
               </a:ext>
             </a:extLst>
           </p:cNvPr>
@@ -3985,8 +4351,8 @@
         </p:nvSpPr>
         <p:spPr>
           <a:xfrm>
-            <a:off x="717884" y="353094"/>
-            <a:ext cx="10515600" cy="1325563"/>
+            <a:off x="0" y="0"/>
+            <a:ext cx="10515600" cy="1060173"/>
           </a:xfrm>
         </p:spPr>
         <p:txBody>
@@ -3995,7 +4361,7 @@
           <a:p>
             <a:r>
               <a:rPr lang="en-GB" dirty="0"/>
-              <a:t>API Sequence Diagrams</a:t>
+              <a:t>Database Design Diagram – Invoices</a:t>
             </a:r>
           </a:p>
         </p:txBody>
@@ -4003,7 +4369,7 @@
     </p:spTree>
     <p:extLst>
       <p:ext uri="{BB962C8B-B14F-4D97-AF65-F5344CB8AC3E}">
-        <p14:creationId xmlns:p14="http://schemas.microsoft.com/office/powerpoint/2010/main" val="335257435"/>
+        <p14:creationId xmlns:p14="http://schemas.microsoft.com/office/powerpoint/2010/main" val="3772828660"/>
       </p:ext>
     </p:extLst>
   </p:cSld>
@@ -4511,20 +4877,20 @@
 </file>
 
 <file path=customXml/item2.xml><?xml version="1.0" encoding="utf-8"?>
-<p:properties xmlns:p="http://schemas.microsoft.com/office/2006/metadata/properties" xmlns:xsi="http://www.w3.org/2001/XMLSchema-instance" xmlns:pc="http://schemas.microsoft.com/office/infopath/2007/PartnerControls">
-  <documentManagement>
-    <_activity xmlns="5463250c-ef04-4d43-b2b5-be1f7b77a557" xsi:nil="true"/>
-  </documentManagement>
-</p:properties>
-</file>
-
-<file path=customXml/item3.xml><?xml version="1.0" encoding="utf-8"?>
 <?mso-contentType ?>
 <FormTemplates xmlns="http://schemas.microsoft.com/sharepoint/v3/contenttype/forms">
   <Display>DocumentLibraryForm</Display>
   <Edit>DocumentLibraryForm</Edit>
   <New>DocumentLibraryForm</New>
 </FormTemplates>
+</file>
+
+<file path=customXml/item3.xml><?xml version="1.0" encoding="utf-8"?>
+<p:properties xmlns:p="http://schemas.microsoft.com/office/2006/metadata/properties" xmlns:xsi="http://www.w3.org/2001/XMLSchema-instance" xmlns:pc="http://schemas.microsoft.com/office/infopath/2007/PartnerControls">
+  <documentManagement>
+    <_activity xmlns="5463250c-ef04-4d43-b2b5-be1f7b77a557" xsi:nil="true"/>
+  </documentManagement>
+</p:properties>
 </file>
 
 <file path=customXml/itemProps1.xml><?xml version="1.0" encoding="utf-8"?>
@@ -4546,6 +4912,14 @@
 </file>
 
 <file path=customXml/itemProps2.xml><?xml version="1.0" encoding="utf-8"?>
+<ds:datastoreItem xmlns:ds="http://schemas.openxmlformats.org/officeDocument/2006/customXml" ds:itemID="{402E2E56-9483-428E-8E2F-7008772C53A0}">
+  <ds:schemaRefs>
+    <ds:schemaRef ds:uri="http://schemas.microsoft.com/sharepoint/v3/contenttype/forms"/>
+  </ds:schemaRefs>
+</ds:datastoreItem>
+</file>
+
+<file path=customXml/itemProps3.xml><?xml version="1.0" encoding="utf-8"?>
 <ds:datastoreItem xmlns:ds="http://schemas.openxmlformats.org/officeDocument/2006/customXml" ds:itemID="{DCB89A5E-C9CA-49DA-9D81-A17830AD916A}">
   <ds:schemaRefs>
     <ds:schemaRef ds:uri="http://purl.org/dc/elements/1.1/"/>
@@ -4559,12 +4933,4 @@
     <ds:schemaRef ds:uri="http://purl.org/dc/dcmitype/"/>
   </ds:schemaRefs>
 </ds:datastoreItem>
-</file>
-
-<file path=customXml/itemProps3.xml><?xml version="1.0" encoding="utf-8"?>
-<ds:datastoreItem xmlns:ds="http://schemas.openxmlformats.org/officeDocument/2006/customXml" ds:itemID="{402E2E56-9483-428E-8E2F-7008772C53A0}">
-  <ds:schemaRefs>
-    <ds:schemaRef ds:uri="http://schemas.microsoft.com/sharepoint/v3/contenttype/forms"/>
-  </ds:schemaRefs>
-</ds:datastoreItem>
 </file>
</xml_diff>